<commit_message>
Polish expression in handbook(zh version)
</commit_message>
<xml_diff>
--- a/docs/brainpy_handbook/ppt/snns.pptx
+++ b/docs/brainpy_handbook/ppt/snns.pptx
@@ -248,7 +248,7 @@
           <a:p>
             <a:fld id="{0E88AB90-0D2D-461D-B22C-FF3F8B460DB8}" type="datetimeFigureOut">
               <a:rPr lang="zh-CN" altLang="en-US" smtClean="0"/>
-              <a:t>2021/4/30</a:t>
+              <a:t>2021/5/5</a:t>
             </a:fld>
             <a:endParaRPr lang="zh-CN" altLang="en-US"/>
           </a:p>
@@ -418,7 +418,7 @@
           <a:p>
             <a:fld id="{0E88AB90-0D2D-461D-B22C-FF3F8B460DB8}" type="datetimeFigureOut">
               <a:rPr lang="zh-CN" altLang="en-US" smtClean="0"/>
-              <a:t>2021/4/30</a:t>
+              <a:t>2021/5/5</a:t>
             </a:fld>
             <a:endParaRPr lang="zh-CN" altLang="en-US"/>
           </a:p>
@@ -598,7 +598,7 @@
           <a:p>
             <a:fld id="{0E88AB90-0D2D-461D-B22C-FF3F8B460DB8}" type="datetimeFigureOut">
               <a:rPr lang="zh-CN" altLang="en-US" smtClean="0"/>
-              <a:t>2021/4/30</a:t>
+              <a:t>2021/5/5</a:t>
             </a:fld>
             <a:endParaRPr lang="zh-CN" altLang="en-US"/>
           </a:p>
@@ -768,7 +768,7 @@
           <a:p>
             <a:fld id="{0E88AB90-0D2D-461D-B22C-FF3F8B460DB8}" type="datetimeFigureOut">
               <a:rPr lang="zh-CN" altLang="en-US" smtClean="0"/>
-              <a:t>2021/4/30</a:t>
+              <a:t>2021/5/5</a:t>
             </a:fld>
             <a:endParaRPr lang="zh-CN" altLang="en-US"/>
           </a:p>
@@ -1012,7 +1012,7 @@
           <a:p>
             <a:fld id="{0E88AB90-0D2D-461D-B22C-FF3F8B460DB8}" type="datetimeFigureOut">
               <a:rPr lang="zh-CN" altLang="en-US" smtClean="0"/>
-              <a:t>2021/4/30</a:t>
+              <a:t>2021/5/5</a:t>
             </a:fld>
             <a:endParaRPr lang="zh-CN" altLang="en-US"/>
           </a:p>
@@ -1244,7 +1244,7 @@
           <a:p>
             <a:fld id="{0E88AB90-0D2D-461D-B22C-FF3F8B460DB8}" type="datetimeFigureOut">
               <a:rPr lang="zh-CN" altLang="en-US" smtClean="0"/>
-              <a:t>2021/4/30</a:t>
+              <a:t>2021/5/5</a:t>
             </a:fld>
             <a:endParaRPr lang="zh-CN" altLang="en-US"/>
           </a:p>
@@ -1611,7 +1611,7 @@
           <a:p>
             <a:fld id="{0E88AB90-0D2D-461D-B22C-FF3F8B460DB8}" type="datetimeFigureOut">
               <a:rPr lang="zh-CN" altLang="en-US" smtClean="0"/>
-              <a:t>2021/4/30</a:t>
+              <a:t>2021/5/5</a:t>
             </a:fld>
             <a:endParaRPr lang="zh-CN" altLang="en-US"/>
           </a:p>
@@ -1729,7 +1729,7 @@
           <a:p>
             <a:fld id="{0E88AB90-0D2D-461D-B22C-FF3F8B460DB8}" type="datetimeFigureOut">
               <a:rPr lang="zh-CN" altLang="en-US" smtClean="0"/>
-              <a:t>2021/4/30</a:t>
+              <a:t>2021/5/5</a:t>
             </a:fld>
             <a:endParaRPr lang="zh-CN" altLang="en-US"/>
           </a:p>
@@ -1824,7 +1824,7 @@
           <a:p>
             <a:fld id="{0E88AB90-0D2D-461D-B22C-FF3F8B460DB8}" type="datetimeFigureOut">
               <a:rPr lang="zh-CN" altLang="en-US" smtClean="0"/>
-              <a:t>2021/4/30</a:t>
+              <a:t>2021/5/5</a:t>
             </a:fld>
             <a:endParaRPr lang="zh-CN" altLang="en-US"/>
           </a:p>
@@ -2101,7 +2101,7 @@
           <a:p>
             <a:fld id="{0E88AB90-0D2D-461D-B22C-FF3F8B460DB8}" type="datetimeFigureOut">
               <a:rPr lang="zh-CN" altLang="en-US" smtClean="0"/>
-              <a:t>2021/4/30</a:t>
+              <a:t>2021/5/5</a:t>
             </a:fld>
             <a:endParaRPr lang="zh-CN" altLang="en-US"/>
           </a:p>
@@ -2358,7 +2358,7 @@
           <a:p>
             <a:fld id="{0E88AB90-0D2D-461D-B22C-FF3F8B460DB8}" type="datetimeFigureOut">
               <a:rPr lang="zh-CN" altLang="en-US" smtClean="0"/>
-              <a:t>2021/4/30</a:t>
+              <a:t>2021/5/5</a:t>
             </a:fld>
             <a:endParaRPr lang="zh-CN" altLang="en-US"/>
           </a:p>
@@ -2571,7 +2571,7 @@
           <a:p>
             <a:fld id="{0E88AB90-0D2D-461D-B22C-FF3F8B460DB8}" type="datetimeFigureOut">
               <a:rPr lang="zh-CN" altLang="en-US" smtClean="0"/>
-              <a:t>2021/4/30</a:t>
+              <a:t>2021/5/5</a:t>
             </a:fld>
             <a:endParaRPr lang="zh-CN" altLang="en-US"/>
           </a:p>
@@ -4940,8 +4940,8 @@
           </a:p>
         </p:txBody>
       </p:sp>
-      <mc:AlternateContent xmlns:mc="http://schemas.openxmlformats.org/markup-compatibility/2006">
-        <mc:Choice xmlns:a14="http://schemas.microsoft.com/office/drawing/2010/main" Requires="a14">
+      <mc:AlternateContent xmlns:mc="http://schemas.openxmlformats.org/markup-compatibility/2006" xmlns:a14="http://schemas.microsoft.com/office/drawing/2010/main">
+        <mc:Choice Requires="a14">
           <p:sp>
             <p:nvSpPr>
               <p:cNvPr id="12" name="文本框 11">
@@ -4976,6 +4976,7 @@
                 </a:r>
               </a:p>
               <a:p>
+                <a:pPr/>
                 <a14:m>
                   <m:oMathPara xmlns:m="http://schemas.openxmlformats.org/officeDocument/2006/math">
                     <m:oMathParaPr>
@@ -5231,7 +5232,7 @@
             </p:txBody>
           </p:sp>
         </mc:Choice>
-        <mc:Fallback>
+        <mc:Fallback xmlns="">
           <p:sp>
             <p:nvSpPr>
               <p:cNvPr id="12" name="文本框 11">
@@ -5422,8 +5423,8 @@
           </a:p>
         </p:txBody>
       </p:sp>
-      <mc:AlternateContent xmlns:mc="http://schemas.openxmlformats.org/markup-compatibility/2006">
-        <mc:Choice xmlns:a14="http://schemas.microsoft.com/office/drawing/2010/main" Requires="a14">
+      <mc:AlternateContent xmlns:mc="http://schemas.openxmlformats.org/markup-compatibility/2006" xmlns:a14="http://schemas.microsoft.com/office/drawing/2010/main">
+        <mc:Choice Requires="a14">
           <p:sp>
             <p:nvSpPr>
               <p:cNvPr id="20" name="文本框 19">
@@ -5461,6 +5462,7 @@
                 </a:endParaRPr>
               </a:p>
               <a:p>
+                <a:pPr/>
                 <a14:m>
                   <m:oMathPara xmlns:m="http://schemas.openxmlformats.org/officeDocument/2006/math">
                     <m:oMathParaPr>
@@ -5581,6 +5583,7 @@
                 <a:endParaRPr lang="en-US" altLang="zh-CN" sz="2000" dirty="0"/>
               </a:p>
               <a:p>
+                <a:pPr/>
                 <a14:m>
                   <m:oMathPara xmlns:m="http://schemas.openxmlformats.org/officeDocument/2006/math">
                     <m:oMathParaPr>
@@ -5653,13 +5656,7 @@
                         <a:rPr lang="en-US" altLang="zh-CN" sz="2000" b="0" i="1" dirty="0" smtClean="0">
                           <a:latin typeface="Cambria Math" panose="02040503050406030204" pitchFamily="18" charset="0"/>
                         </a:rPr>
-                        <m:t>−</m:t>
-                      </m:r>
-                      <m:r>
-                        <a:rPr lang="en-US" altLang="zh-CN" sz="2000" b="0" i="1" dirty="0" smtClean="0">
-                          <a:latin typeface="Cambria Math" panose="02040503050406030204" pitchFamily="18" charset="0"/>
-                        </a:rPr>
-                        <m:t> </m:t>
+                        <m:t>− </m:t>
                       </m:r>
                       <m:sSub>
                         <m:sSubPr>
@@ -5709,7 +5706,7 @@
             </p:txBody>
           </p:sp>
         </mc:Choice>
-        <mc:Fallback>
+        <mc:Fallback xmlns="">
           <p:sp>
             <p:nvSpPr>
               <p:cNvPr id="20" name="文本框 19">

</xml_diff>